<commit_message>
Added a script that converts every PDF (from PowerPoint) site for site to a usable SVG file
-> Updated all images in the same step
</commit_message>
<xml_diff>
--- a/ImageResources/ProjectFiles/installer.pptx
+++ b/ImageResources/ProjectFiles/installer.pptx
@@ -124,7 +124,7 @@
 </file>
 
 <file path=ppt/slideLayouts/slideLayout1.xml><?xml version="1.0" encoding="utf-8"?>
-<p:sldLayout xmlns:a="http://schemas.openxmlformats.org/drawingml/2006/main" xmlns:r="http://schemas.openxmlformats.org/officeDocument/2006/relationships" xmlns:p="http://schemas.openxmlformats.org/presentationml/2006/main" type="title" preserve="1">
+<p:sldLayout xmlns:a="http://schemas.openxmlformats.org/drawingml/2006/main" xmlns:r="http://schemas.openxmlformats.org/officeDocument/2006/relationships" xmlns:p="http://schemas.openxmlformats.org/presentationml/2006/main" showMasterSp="0" type="title" preserve="1">
   <p:cSld name="Titelfolie">
     <p:spTree>
       <p:nvGrpSpPr>
@@ -254,7 +254,7 @@
           <a:p>
             <a:fld id="{9E2A6698-0C91-4185-99A0-59A61138E5C6}" type="datetimeFigureOut">
               <a:rPr lang="de-DE" smtClean="0"/>
-              <a:t>22.09.2017</a:t>
+              <a:t>04.10.2017</a:t>
             </a:fld>
             <a:endParaRPr lang="de-DE"/>
           </a:p>
@@ -316,7 +316,7 @@
 </file>
 
 <file path=ppt/slideLayouts/slideLayout10.xml><?xml version="1.0" encoding="utf-8"?>
-<p:sldLayout xmlns:a="http://schemas.openxmlformats.org/drawingml/2006/main" xmlns:r="http://schemas.openxmlformats.org/officeDocument/2006/relationships" xmlns:p="http://schemas.openxmlformats.org/presentationml/2006/main" type="vertTx" preserve="1">
+<p:sldLayout xmlns:a="http://schemas.openxmlformats.org/drawingml/2006/main" xmlns:r="http://schemas.openxmlformats.org/officeDocument/2006/relationships" xmlns:p="http://schemas.openxmlformats.org/presentationml/2006/main" showMasterSp="0" type="vertTx" preserve="1">
   <p:cSld name="Titel und vertikaler Text">
     <p:spTree>
       <p:nvGrpSpPr>
@@ -424,7 +424,7 @@
           <a:p>
             <a:fld id="{9E2A6698-0C91-4185-99A0-59A61138E5C6}" type="datetimeFigureOut">
               <a:rPr lang="de-DE" smtClean="0"/>
-              <a:t>22.09.2017</a:t>
+              <a:t>04.10.2017</a:t>
             </a:fld>
             <a:endParaRPr lang="de-DE"/>
           </a:p>
@@ -486,7 +486,7 @@
 </file>
 
 <file path=ppt/slideLayouts/slideLayout11.xml><?xml version="1.0" encoding="utf-8"?>
-<p:sldLayout xmlns:a="http://schemas.openxmlformats.org/drawingml/2006/main" xmlns:r="http://schemas.openxmlformats.org/officeDocument/2006/relationships" xmlns:p="http://schemas.openxmlformats.org/presentationml/2006/main" type="vertTitleAndTx" preserve="1">
+<p:sldLayout xmlns:a="http://schemas.openxmlformats.org/drawingml/2006/main" xmlns:r="http://schemas.openxmlformats.org/officeDocument/2006/relationships" xmlns:p="http://schemas.openxmlformats.org/presentationml/2006/main" showMasterSp="0" type="vertTitleAndTx" preserve="1">
   <p:cSld name="Vertikaler Titel und Text">
     <p:spTree>
       <p:nvGrpSpPr>
@@ -604,7 +604,7 @@
           <a:p>
             <a:fld id="{9E2A6698-0C91-4185-99A0-59A61138E5C6}" type="datetimeFigureOut">
               <a:rPr lang="de-DE" smtClean="0"/>
-              <a:t>22.09.2017</a:t>
+              <a:t>04.10.2017</a:t>
             </a:fld>
             <a:endParaRPr lang="de-DE"/>
           </a:p>
@@ -666,7 +666,7 @@
 </file>
 
 <file path=ppt/slideLayouts/slideLayout2.xml><?xml version="1.0" encoding="utf-8"?>
-<p:sldLayout xmlns:a="http://schemas.openxmlformats.org/drawingml/2006/main" xmlns:r="http://schemas.openxmlformats.org/officeDocument/2006/relationships" xmlns:p="http://schemas.openxmlformats.org/presentationml/2006/main" type="obj" preserve="1">
+<p:sldLayout xmlns:a="http://schemas.openxmlformats.org/drawingml/2006/main" xmlns:r="http://schemas.openxmlformats.org/officeDocument/2006/relationships" xmlns:p="http://schemas.openxmlformats.org/presentationml/2006/main" showMasterSp="0" type="obj" preserve="1">
   <p:cSld name="Titel und Inhalt">
     <p:spTree>
       <p:nvGrpSpPr>
@@ -774,7 +774,7 @@
           <a:p>
             <a:fld id="{9E2A6698-0C91-4185-99A0-59A61138E5C6}" type="datetimeFigureOut">
               <a:rPr lang="de-DE" smtClean="0"/>
-              <a:t>22.09.2017</a:t>
+              <a:t>04.10.2017</a:t>
             </a:fld>
             <a:endParaRPr lang="de-DE"/>
           </a:p>
@@ -836,7 +836,7 @@
 </file>
 
 <file path=ppt/slideLayouts/slideLayout3.xml><?xml version="1.0" encoding="utf-8"?>
-<p:sldLayout xmlns:a="http://schemas.openxmlformats.org/drawingml/2006/main" xmlns:r="http://schemas.openxmlformats.org/officeDocument/2006/relationships" xmlns:p="http://schemas.openxmlformats.org/presentationml/2006/main" type="secHead" preserve="1">
+<p:sldLayout xmlns:a="http://schemas.openxmlformats.org/drawingml/2006/main" xmlns:r="http://schemas.openxmlformats.org/officeDocument/2006/relationships" xmlns:p="http://schemas.openxmlformats.org/presentationml/2006/main" showMasterSp="0" type="secHead" preserve="1">
   <p:cSld name="Abschnitts-&#10;überschrift">
     <p:spTree>
       <p:nvGrpSpPr>
@@ -1018,7 +1018,7 @@
           <a:p>
             <a:fld id="{9E2A6698-0C91-4185-99A0-59A61138E5C6}" type="datetimeFigureOut">
               <a:rPr lang="de-DE" smtClean="0"/>
-              <a:t>22.09.2017</a:t>
+              <a:t>04.10.2017</a:t>
             </a:fld>
             <a:endParaRPr lang="de-DE"/>
           </a:p>
@@ -1080,7 +1080,7 @@
 </file>
 
 <file path=ppt/slideLayouts/slideLayout4.xml><?xml version="1.0" encoding="utf-8"?>
-<p:sldLayout xmlns:a="http://schemas.openxmlformats.org/drawingml/2006/main" xmlns:r="http://schemas.openxmlformats.org/officeDocument/2006/relationships" xmlns:p="http://schemas.openxmlformats.org/presentationml/2006/main" type="twoObj" preserve="1">
+<p:sldLayout xmlns:a="http://schemas.openxmlformats.org/drawingml/2006/main" xmlns:r="http://schemas.openxmlformats.org/officeDocument/2006/relationships" xmlns:p="http://schemas.openxmlformats.org/presentationml/2006/main" showMasterSp="0" type="twoObj" preserve="1">
   <p:cSld name="Zwei Inhalte">
     <p:spTree>
       <p:nvGrpSpPr>
@@ -1250,7 +1250,7 @@
           <a:p>
             <a:fld id="{9E2A6698-0C91-4185-99A0-59A61138E5C6}" type="datetimeFigureOut">
               <a:rPr lang="de-DE" smtClean="0"/>
-              <a:t>22.09.2017</a:t>
+              <a:t>04.10.2017</a:t>
             </a:fld>
             <a:endParaRPr lang="de-DE"/>
           </a:p>
@@ -1312,7 +1312,7 @@
 </file>
 
 <file path=ppt/slideLayouts/slideLayout5.xml><?xml version="1.0" encoding="utf-8"?>
-<p:sldLayout xmlns:a="http://schemas.openxmlformats.org/drawingml/2006/main" xmlns:r="http://schemas.openxmlformats.org/officeDocument/2006/relationships" xmlns:p="http://schemas.openxmlformats.org/presentationml/2006/main" type="twoTxTwoObj" preserve="1">
+<p:sldLayout xmlns:a="http://schemas.openxmlformats.org/drawingml/2006/main" xmlns:r="http://schemas.openxmlformats.org/officeDocument/2006/relationships" xmlns:p="http://schemas.openxmlformats.org/presentationml/2006/main" showMasterSp="0" type="twoTxTwoObj" preserve="1">
   <p:cSld name="Vergleich">
     <p:spTree>
       <p:nvGrpSpPr>
@@ -1617,7 +1617,7 @@
           <a:p>
             <a:fld id="{9E2A6698-0C91-4185-99A0-59A61138E5C6}" type="datetimeFigureOut">
               <a:rPr lang="de-DE" smtClean="0"/>
-              <a:t>22.09.2017</a:t>
+              <a:t>04.10.2017</a:t>
             </a:fld>
             <a:endParaRPr lang="de-DE"/>
           </a:p>
@@ -1679,7 +1679,7 @@
 </file>
 
 <file path=ppt/slideLayouts/slideLayout6.xml><?xml version="1.0" encoding="utf-8"?>
-<p:sldLayout xmlns:a="http://schemas.openxmlformats.org/drawingml/2006/main" xmlns:r="http://schemas.openxmlformats.org/officeDocument/2006/relationships" xmlns:p="http://schemas.openxmlformats.org/presentationml/2006/main" type="titleOnly" preserve="1">
+<p:sldLayout xmlns:a="http://schemas.openxmlformats.org/drawingml/2006/main" xmlns:r="http://schemas.openxmlformats.org/officeDocument/2006/relationships" xmlns:p="http://schemas.openxmlformats.org/presentationml/2006/main" showMasterSp="0" type="titleOnly" preserve="1">
   <p:cSld name="Nur Titel">
     <p:spTree>
       <p:nvGrpSpPr>
@@ -1735,7 +1735,7 @@
           <a:p>
             <a:fld id="{9E2A6698-0C91-4185-99A0-59A61138E5C6}" type="datetimeFigureOut">
               <a:rPr lang="de-DE" smtClean="0"/>
-              <a:t>22.09.2017</a:t>
+              <a:t>04.10.2017</a:t>
             </a:fld>
             <a:endParaRPr lang="de-DE"/>
           </a:p>
@@ -1797,7 +1797,7 @@
 </file>
 
 <file path=ppt/slideLayouts/slideLayout7.xml><?xml version="1.0" encoding="utf-8"?>
-<p:sldLayout xmlns:a="http://schemas.openxmlformats.org/drawingml/2006/main" xmlns:r="http://schemas.openxmlformats.org/officeDocument/2006/relationships" xmlns:p="http://schemas.openxmlformats.org/presentationml/2006/main" type="blank" preserve="1">
+<p:sldLayout xmlns:a="http://schemas.openxmlformats.org/drawingml/2006/main" xmlns:r="http://schemas.openxmlformats.org/officeDocument/2006/relationships" xmlns:p="http://schemas.openxmlformats.org/presentationml/2006/main" showMasterSp="0" type="blank" preserve="1">
   <p:cSld name="Leer">
     <p:spTree>
       <p:nvGrpSpPr>
@@ -1830,7 +1830,7 @@
           <a:p>
             <a:fld id="{9E2A6698-0C91-4185-99A0-59A61138E5C6}" type="datetimeFigureOut">
               <a:rPr lang="de-DE" smtClean="0"/>
-              <a:t>22.09.2017</a:t>
+              <a:t>04.10.2017</a:t>
             </a:fld>
             <a:endParaRPr lang="de-DE"/>
           </a:p>
@@ -1892,7 +1892,7 @@
 </file>
 
 <file path=ppt/slideLayouts/slideLayout8.xml><?xml version="1.0" encoding="utf-8"?>
-<p:sldLayout xmlns:a="http://schemas.openxmlformats.org/drawingml/2006/main" xmlns:r="http://schemas.openxmlformats.org/officeDocument/2006/relationships" xmlns:p="http://schemas.openxmlformats.org/presentationml/2006/main" type="objTx" preserve="1">
+<p:sldLayout xmlns:a="http://schemas.openxmlformats.org/drawingml/2006/main" xmlns:r="http://schemas.openxmlformats.org/officeDocument/2006/relationships" xmlns:p="http://schemas.openxmlformats.org/presentationml/2006/main" showMasterSp="0" type="objTx" preserve="1">
   <p:cSld name="Inhalt mit Überschrift">
     <p:spTree>
       <p:nvGrpSpPr>
@@ -2107,7 +2107,7 @@
           <a:p>
             <a:fld id="{9E2A6698-0C91-4185-99A0-59A61138E5C6}" type="datetimeFigureOut">
               <a:rPr lang="de-DE" smtClean="0"/>
-              <a:t>22.09.2017</a:t>
+              <a:t>04.10.2017</a:t>
             </a:fld>
             <a:endParaRPr lang="de-DE"/>
           </a:p>
@@ -2169,7 +2169,7 @@
 </file>
 
 <file path=ppt/slideLayouts/slideLayout9.xml><?xml version="1.0" encoding="utf-8"?>
-<p:sldLayout xmlns:a="http://schemas.openxmlformats.org/drawingml/2006/main" xmlns:r="http://schemas.openxmlformats.org/officeDocument/2006/relationships" xmlns:p="http://schemas.openxmlformats.org/presentationml/2006/main" type="picTx" preserve="1">
+<p:sldLayout xmlns:a="http://schemas.openxmlformats.org/drawingml/2006/main" xmlns:r="http://schemas.openxmlformats.org/officeDocument/2006/relationships" xmlns:p="http://schemas.openxmlformats.org/presentationml/2006/main" showMasterSp="0" type="picTx" preserve="1">
   <p:cSld name="Bild mit Überschrift">
     <p:spTree>
       <p:nvGrpSpPr>
@@ -2364,7 +2364,7 @@
           <a:p>
             <a:fld id="{9E2A6698-0C91-4185-99A0-59A61138E5C6}" type="datetimeFigureOut">
               <a:rPr lang="de-DE" smtClean="0"/>
-              <a:t>22.09.2017</a:t>
+              <a:t>04.10.2017</a:t>
             </a:fld>
             <a:endParaRPr lang="de-DE"/>
           </a:p>
@@ -2429,9 +2429,14 @@
 <p:sldMaster xmlns:a="http://schemas.openxmlformats.org/drawingml/2006/main" xmlns:r="http://schemas.openxmlformats.org/officeDocument/2006/relationships" xmlns:p="http://schemas.openxmlformats.org/presentationml/2006/main">
   <p:cSld>
     <p:bg>
-      <p:bgRef idx="1001">
-        <a:schemeClr val="bg1"/>
-      </p:bgRef>
+      <p:bgPr>
+        <a:solidFill>
+          <a:schemeClr val="bg1">
+            <a:alpha val="0"/>
+          </a:schemeClr>
+        </a:solidFill>
+        <a:effectLst/>
+      </p:bgPr>
     </p:bg>
     <p:spTree>
       <p:nvGrpSpPr>
@@ -2577,7 +2582,7 @@
           <a:p>
             <a:fld id="{9E2A6698-0C91-4185-99A0-59A61138E5C6}" type="datetimeFigureOut">
               <a:rPr lang="de-DE" smtClean="0"/>
-              <a:t>22.09.2017</a:t>
+              <a:t>04.10.2017</a:t>
             </a:fld>
             <a:endParaRPr lang="de-DE"/>
           </a:p>
@@ -2966,7 +2971,7 @@
 </file>
 
 <file path=ppt/slides/slide1.xml><?xml version="1.0" encoding="utf-8"?>
-<p:sld xmlns:a="http://schemas.openxmlformats.org/drawingml/2006/main" xmlns:r="http://schemas.openxmlformats.org/officeDocument/2006/relationships" xmlns:p="http://schemas.openxmlformats.org/presentationml/2006/main">
+<p:sld xmlns:a="http://schemas.openxmlformats.org/drawingml/2006/main" xmlns:r="http://schemas.openxmlformats.org/officeDocument/2006/relationships" xmlns:p="http://schemas.openxmlformats.org/presentationml/2006/main" showMasterSp="0">
   <p:cSld>
     <p:spTree>
       <p:nvGrpSpPr>

</xml_diff>

<commit_message>
Update of icon image + added a preload image
because of the image update all icons and installer images were updated too
</commit_message>
<xml_diff>
--- a/ImageResources/ProjectFiles/installer.pptx
+++ b/ImageResources/ProjectFiles/installer.pptx
@@ -123,6 +123,10 @@
 </p:presentation>
 </file>
 
+<file path=ppt/revisionInfo.xml><?xml version="1.0" encoding="utf-8"?>
+<p1510:revInfo xmlns:a="http://schemas.openxmlformats.org/drawingml/2006/main" xmlns:r="http://schemas.openxmlformats.org/officeDocument/2006/relationships" xmlns:p1510="http://schemas.microsoft.com/office/powerpoint/2015/10/main"/>
+</file>
+
 <file path=ppt/slideLayouts/slideLayout1.xml><?xml version="1.0" encoding="utf-8"?>
 <p:sldLayout xmlns:a="http://schemas.openxmlformats.org/drawingml/2006/main" xmlns:r="http://schemas.openxmlformats.org/officeDocument/2006/relationships" xmlns:p="http://schemas.openxmlformats.org/presentationml/2006/main" showMasterSp="0" type="title" preserve="1">
   <p:cSld name="Titelfolie">
@@ -165,7 +169,7 @@
           </a:lstStyle>
           <a:p>
             <a:r>
-              <a:rPr lang="de-DE" smtClean="0"/>
+              <a:rPr lang="de-DE"/>
               <a:t>Titelmasterformat durch Klicken bearbeiten</a:t>
             </a:r>
             <a:endParaRPr lang="en-US" dirty="0"/>
@@ -230,7 +234,7 @@
           </a:lstStyle>
           <a:p>
             <a:r>
-              <a:rPr lang="de-DE" smtClean="0"/>
+              <a:rPr lang="de-DE"/>
               <a:t>Formatvorlage des Untertitelmasters durch Klicken bearbeiten</a:t>
             </a:r>
             <a:endParaRPr lang="en-US" dirty="0"/>
@@ -254,7 +258,7 @@
           <a:p>
             <a:fld id="{9E2A6698-0C91-4185-99A0-59A61138E5C6}" type="datetimeFigureOut">
               <a:rPr lang="de-DE" smtClean="0"/>
-              <a:t>04.10.2017</a:t>
+              <a:t>09.10.2017</a:t>
             </a:fld>
             <a:endParaRPr lang="de-DE"/>
           </a:p>
@@ -348,7 +352,7 @@
           <a:lstStyle/>
           <a:p>
             <a:r>
-              <a:rPr lang="de-DE" smtClean="0"/>
+              <a:rPr lang="de-DE"/>
               <a:t>Titelmasterformat durch Klicken bearbeiten</a:t>
             </a:r>
             <a:endParaRPr lang="en-US" dirty="0"/>
@@ -372,35 +376,35 @@
           <a:p>
             <a:pPr lvl="0"/>
             <a:r>
-              <a:rPr lang="de-DE" smtClean="0"/>
+              <a:rPr lang="de-DE"/>
               <a:t>Textmasterformat bearbeiten</a:t>
             </a:r>
           </a:p>
           <a:p>
             <a:pPr lvl="1"/>
             <a:r>
-              <a:rPr lang="de-DE" smtClean="0"/>
+              <a:rPr lang="de-DE"/>
               <a:t>Zweite Ebene</a:t>
             </a:r>
           </a:p>
           <a:p>
             <a:pPr lvl="2"/>
             <a:r>
-              <a:rPr lang="de-DE" smtClean="0"/>
+              <a:rPr lang="de-DE"/>
               <a:t>Dritte Ebene</a:t>
             </a:r>
           </a:p>
           <a:p>
             <a:pPr lvl="3"/>
             <a:r>
-              <a:rPr lang="de-DE" smtClean="0"/>
+              <a:rPr lang="de-DE"/>
               <a:t>Vierte Ebene</a:t>
             </a:r>
           </a:p>
           <a:p>
             <a:pPr lvl="4"/>
             <a:r>
-              <a:rPr lang="de-DE" smtClean="0"/>
+              <a:rPr lang="de-DE"/>
               <a:t>Fünfte Ebene</a:t>
             </a:r>
             <a:endParaRPr lang="en-US" dirty="0"/>
@@ -424,7 +428,7 @@
           <a:p>
             <a:fld id="{9E2A6698-0C91-4185-99A0-59A61138E5C6}" type="datetimeFigureOut">
               <a:rPr lang="de-DE" smtClean="0"/>
-              <a:t>04.10.2017</a:t>
+              <a:t>09.10.2017</a:t>
             </a:fld>
             <a:endParaRPr lang="de-DE"/>
           </a:p>
@@ -523,7 +527,7 @@
           <a:lstStyle/>
           <a:p>
             <a:r>
-              <a:rPr lang="de-DE" smtClean="0"/>
+              <a:rPr lang="de-DE"/>
               <a:t>Titelmasterformat durch Klicken bearbeiten</a:t>
             </a:r>
             <a:endParaRPr lang="en-US" dirty="0"/>
@@ -552,35 +556,35 @@
           <a:p>
             <a:pPr lvl="0"/>
             <a:r>
-              <a:rPr lang="de-DE" smtClean="0"/>
+              <a:rPr lang="de-DE"/>
               <a:t>Textmasterformat bearbeiten</a:t>
             </a:r>
           </a:p>
           <a:p>
             <a:pPr lvl="1"/>
             <a:r>
-              <a:rPr lang="de-DE" smtClean="0"/>
+              <a:rPr lang="de-DE"/>
               <a:t>Zweite Ebene</a:t>
             </a:r>
           </a:p>
           <a:p>
             <a:pPr lvl="2"/>
             <a:r>
-              <a:rPr lang="de-DE" smtClean="0"/>
+              <a:rPr lang="de-DE"/>
               <a:t>Dritte Ebene</a:t>
             </a:r>
           </a:p>
           <a:p>
             <a:pPr lvl="3"/>
             <a:r>
-              <a:rPr lang="de-DE" smtClean="0"/>
+              <a:rPr lang="de-DE"/>
               <a:t>Vierte Ebene</a:t>
             </a:r>
           </a:p>
           <a:p>
             <a:pPr lvl="4"/>
             <a:r>
-              <a:rPr lang="de-DE" smtClean="0"/>
+              <a:rPr lang="de-DE"/>
               <a:t>Fünfte Ebene</a:t>
             </a:r>
             <a:endParaRPr lang="en-US" dirty="0"/>
@@ -604,7 +608,7 @@
           <a:p>
             <a:fld id="{9E2A6698-0C91-4185-99A0-59A61138E5C6}" type="datetimeFigureOut">
               <a:rPr lang="de-DE" smtClean="0"/>
-              <a:t>04.10.2017</a:t>
+              <a:t>09.10.2017</a:t>
             </a:fld>
             <a:endParaRPr lang="de-DE"/>
           </a:p>
@@ -698,7 +702,7 @@
           <a:lstStyle/>
           <a:p>
             <a:r>
-              <a:rPr lang="de-DE" smtClean="0"/>
+              <a:rPr lang="de-DE"/>
               <a:t>Titelmasterformat durch Klicken bearbeiten</a:t>
             </a:r>
             <a:endParaRPr lang="en-US" dirty="0"/>
@@ -722,35 +726,35 @@
           <a:p>
             <a:pPr lvl="0"/>
             <a:r>
-              <a:rPr lang="de-DE" smtClean="0"/>
+              <a:rPr lang="de-DE"/>
               <a:t>Textmasterformat bearbeiten</a:t>
             </a:r>
           </a:p>
           <a:p>
             <a:pPr lvl="1"/>
             <a:r>
-              <a:rPr lang="de-DE" smtClean="0"/>
+              <a:rPr lang="de-DE"/>
               <a:t>Zweite Ebene</a:t>
             </a:r>
           </a:p>
           <a:p>
             <a:pPr lvl="2"/>
             <a:r>
-              <a:rPr lang="de-DE" smtClean="0"/>
+              <a:rPr lang="de-DE"/>
               <a:t>Dritte Ebene</a:t>
             </a:r>
           </a:p>
           <a:p>
             <a:pPr lvl="3"/>
             <a:r>
-              <a:rPr lang="de-DE" smtClean="0"/>
+              <a:rPr lang="de-DE"/>
               <a:t>Vierte Ebene</a:t>
             </a:r>
           </a:p>
           <a:p>
             <a:pPr lvl="4"/>
             <a:r>
-              <a:rPr lang="de-DE" smtClean="0"/>
+              <a:rPr lang="de-DE"/>
               <a:t>Fünfte Ebene</a:t>
             </a:r>
             <a:endParaRPr lang="en-US" dirty="0"/>
@@ -774,7 +778,7 @@
           <a:p>
             <a:fld id="{9E2A6698-0C91-4185-99A0-59A61138E5C6}" type="datetimeFigureOut">
               <a:rPr lang="de-DE" smtClean="0"/>
-              <a:t>04.10.2017</a:t>
+              <a:t>09.10.2017</a:t>
             </a:fld>
             <a:endParaRPr lang="de-DE"/>
           </a:p>
@@ -877,7 +881,7 @@
           </a:lstStyle>
           <a:p>
             <a:r>
-              <a:rPr lang="de-DE" smtClean="0"/>
+              <a:rPr lang="de-DE"/>
               <a:t>Titelmasterformat durch Klicken bearbeiten</a:t>
             </a:r>
             <a:endParaRPr lang="en-US" dirty="0"/>
@@ -995,7 +999,7 @@
           <a:p>
             <a:pPr lvl="0"/>
             <a:r>
-              <a:rPr lang="de-DE" smtClean="0"/>
+              <a:rPr lang="de-DE"/>
               <a:t>Textmasterformat bearbeiten</a:t>
             </a:r>
           </a:p>
@@ -1018,7 +1022,7 @@
           <a:p>
             <a:fld id="{9E2A6698-0C91-4185-99A0-59A61138E5C6}" type="datetimeFigureOut">
               <a:rPr lang="de-DE" smtClean="0"/>
-              <a:t>04.10.2017</a:t>
+              <a:t>09.10.2017</a:t>
             </a:fld>
             <a:endParaRPr lang="de-DE"/>
           </a:p>
@@ -1112,7 +1116,7 @@
           <a:lstStyle/>
           <a:p>
             <a:r>
-              <a:rPr lang="de-DE" smtClean="0"/>
+              <a:rPr lang="de-DE"/>
               <a:t>Titelmasterformat durch Klicken bearbeiten</a:t>
             </a:r>
             <a:endParaRPr lang="en-US" dirty="0"/>
@@ -1141,35 +1145,35 @@
           <a:p>
             <a:pPr lvl="0"/>
             <a:r>
-              <a:rPr lang="de-DE" smtClean="0"/>
+              <a:rPr lang="de-DE"/>
               <a:t>Textmasterformat bearbeiten</a:t>
             </a:r>
           </a:p>
           <a:p>
             <a:pPr lvl="1"/>
             <a:r>
-              <a:rPr lang="de-DE" smtClean="0"/>
+              <a:rPr lang="de-DE"/>
               <a:t>Zweite Ebene</a:t>
             </a:r>
           </a:p>
           <a:p>
             <a:pPr lvl="2"/>
             <a:r>
-              <a:rPr lang="de-DE" smtClean="0"/>
+              <a:rPr lang="de-DE"/>
               <a:t>Dritte Ebene</a:t>
             </a:r>
           </a:p>
           <a:p>
             <a:pPr lvl="3"/>
             <a:r>
-              <a:rPr lang="de-DE" smtClean="0"/>
+              <a:rPr lang="de-DE"/>
               <a:t>Vierte Ebene</a:t>
             </a:r>
           </a:p>
           <a:p>
             <a:pPr lvl="4"/>
             <a:r>
-              <a:rPr lang="de-DE" smtClean="0"/>
+              <a:rPr lang="de-DE"/>
               <a:t>Fünfte Ebene</a:t>
             </a:r>
             <a:endParaRPr lang="en-US" dirty="0"/>
@@ -1198,35 +1202,35 @@
           <a:p>
             <a:pPr lvl="0"/>
             <a:r>
-              <a:rPr lang="de-DE" smtClean="0"/>
+              <a:rPr lang="de-DE"/>
               <a:t>Textmasterformat bearbeiten</a:t>
             </a:r>
           </a:p>
           <a:p>
             <a:pPr lvl="1"/>
             <a:r>
-              <a:rPr lang="de-DE" smtClean="0"/>
+              <a:rPr lang="de-DE"/>
               <a:t>Zweite Ebene</a:t>
             </a:r>
           </a:p>
           <a:p>
             <a:pPr lvl="2"/>
             <a:r>
-              <a:rPr lang="de-DE" smtClean="0"/>
+              <a:rPr lang="de-DE"/>
               <a:t>Dritte Ebene</a:t>
             </a:r>
           </a:p>
           <a:p>
             <a:pPr lvl="3"/>
             <a:r>
-              <a:rPr lang="de-DE" smtClean="0"/>
+              <a:rPr lang="de-DE"/>
               <a:t>Vierte Ebene</a:t>
             </a:r>
           </a:p>
           <a:p>
             <a:pPr lvl="4"/>
             <a:r>
-              <a:rPr lang="de-DE" smtClean="0"/>
+              <a:rPr lang="de-DE"/>
               <a:t>Fünfte Ebene</a:t>
             </a:r>
             <a:endParaRPr lang="en-US" dirty="0"/>
@@ -1250,7 +1254,7 @@
           <a:p>
             <a:fld id="{9E2A6698-0C91-4185-99A0-59A61138E5C6}" type="datetimeFigureOut">
               <a:rPr lang="de-DE" smtClean="0"/>
-              <a:t>04.10.2017</a:t>
+              <a:t>09.10.2017</a:t>
             </a:fld>
             <a:endParaRPr lang="de-DE"/>
           </a:p>
@@ -1349,7 +1353,7 @@
           <a:lstStyle/>
           <a:p>
             <a:r>
-              <a:rPr lang="de-DE" smtClean="0"/>
+              <a:rPr lang="de-DE"/>
               <a:t>Titelmasterformat durch Klicken bearbeiten</a:t>
             </a:r>
             <a:endParaRPr lang="en-US" dirty="0"/>
@@ -1415,7 +1419,7 @@
           <a:p>
             <a:pPr lvl="0"/>
             <a:r>
-              <a:rPr lang="de-DE" smtClean="0"/>
+              <a:rPr lang="de-DE"/>
               <a:t>Textmasterformat bearbeiten</a:t>
             </a:r>
           </a:p>
@@ -1443,35 +1447,35 @@
           <a:p>
             <a:pPr lvl="0"/>
             <a:r>
-              <a:rPr lang="de-DE" smtClean="0"/>
+              <a:rPr lang="de-DE"/>
               <a:t>Textmasterformat bearbeiten</a:t>
             </a:r>
           </a:p>
           <a:p>
             <a:pPr lvl="1"/>
             <a:r>
-              <a:rPr lang="de-DE" smtClean="0"/>
+              <a:rPr lang="de-DE"/>
               <a:t>Zweite Ebene</a:t>
             </a:r>
           </a:p>
           <a:p>
             <a:pPr lvl="2"/>
             <a:r>
-              <a:rPr lang="de-DE" smtClean="0"/>
+              <a:rPr lang="de-DE"/>
               <a:t>Dritte Ebene</a:t>
             </a:r>
           </a:p>
           <a:p>
             <a:pPr lvl="3"/>
             <a:r>
-              <a:rPr lang="de-DE" smtClean="0"/>
+              <a:rPr lang="de-DE"/>
               <a:t>Vierte Ebene</a:t>
             </a:r>
           </a:p>
           <a:p>
             <a:pPr lvl="4"/>
             <a:r>
-              <a:rPr lang="de-DE" smtClean="0"/>
+              <a:rPr lang="de-DE"/>
               <a:t>Fünfte Ebene</a:t>
             </a:r>
             <a:endParaRPr lang="en-US" dirty="0"/>
@@ -1537,7 +1541,7 @@
           <a:p>
             <a:pPr lvl="0"/>
             <a:r>
-              <a:rPr lang="de-DE" smtClean="0"/>
+              <a:rPr lang="de-DE"/>
               <a:t>Textmasterformat bearbeiten</a:t>
             </a:r>
           </a:p>
@@ -1565,35 +1569,35 @@
           <a:p>
             <a:pPr lvl="0"/>
             <a:r>
-              <a:rPr lang="de-DE" smtClean="0"/>
+              <a:rPr lang="de-DE"/>
               <a:t>Textmasterformat bearbeiten</a:t>
             </a:r>
           </a:p>
           <a:p>
             <a:pPr lvl="1"/>
             <a:r>
-              <a:rPr lang="de-DE" smtClean="0"/>
+              <a:rPr lang="de-DE"/>
               <a:t>Zweite Ebene</a:t>
             </a:r>
           </a:p>
           <a:p>
             <a:pPr lvl="2"/>
             <a:r>
-              <a:rPr lang="de-DE" smtClean="0"/>
+              <a:rPr lang="de-DE"/>
               <a:t>Dritte Ebene</a:t>
             </a:r>
           </a:p>
           <a:p>
             <a:pPr lvl="3"/>
             <a:r>
-              <a:rPr lang="de-DE" smtClean="0"/>
+              <a:rPr lang="de-DE"/>
               <a:t>Vierte Ebene</a:t>
             </a:r>
           </a:p>
           <a:p>
             <a:pPr lvl="4"/>
             <a:r>
-              <a:rPr lang="de-DE" smtClean="0"/>
+              <a:rPr lang="de-DE"/>
               <a:t>Fünfte Ebene</a:t>
             </a:r>
             <a:endParaRPr lang="en-US" dirty="0"/>
@@ -1617,7 +1621,7 @@
           <a:p>
             <a:fld id="{9E2A6698-0C91-4185-99A0-59A61138E5C6}" type="datetimeFigureOut">
               <a:rPr lang="de-DE" smtClean="0"/>
-              <a:t>04.10.2017</a:t>
+              <a:t>09.10.2017</a:t>
             </a:fld>
             <a:endParaRPr lang="de-DE"/>
           </a:p>
@@ -1711,7 +1715,7 @@
           <a:lstStyle/>
           <a:p>
             <a:r>
-              <a:rPr lang="de-DE" smtClean="0"/>
+              <a:rPr lang="de-DE"/>
               <a:t>Titelmasterformat durch Klicken bearbeiten</a:t>
             </a:r>
             <a:endParaRPr lang="en-US" dirty="0"/>
@@ -1735,7 +1739,7 @@
           <a:p>
             <a:fld id="{9E2A6698-0C91-4185-99A0-59A61138E5C6}" type="datetimeFigureOut">
               <a:rPr lang="de-DE" smtClean="0"/>
-              <a:t>04.10.2017</a:t>
+              <a:t>09.10.2017</a:t>
             </a:fld>
             <a:endParaRPr lang="de-DE"/>
           </a:p>
@@ -1830,7 +1834,7 @@
           <a:p>
             <a:fld id="{9E2A6698-0C91-4185-99A0-59A61138E5C6}" type="datetimeFigureOut">
               <a:rPr lang="de-DE" smtClean="0"/>
-              <a:t>04.10.2017</a:t>
+              <a:t>09.10.2017</a:t>
             </a:fld>
             <a:endParaRPr lang="de-DE"/>
           </a:p>
@@ -1933,7 +1937,7 @@
           </a:lstStyle>
           <a:p>
             <a:r>
-              <a:rPr lang="de-DE" smtClean="0"/>
+              <a:rPr lang="de-DE"/>
               <a:t>Titelmasterformat durch Klicken bearbeiten</a:t>
             </a:r>
             <a:endParaRPr lang="en-US" dirty="0"/>
@@ -1990,35 +1994,35 @@
           <a:p>
             <a:pPr lvl="0"/>
             <a:r>
-              <a:rPr lang="de-DE" smtClean="0"/>
+              <a:rPr lang="de-DE"/>
               <a:t>Textmasterformat bearbeiten</a:t>
             </a:r>
           </a:p>
           <a:p>
             <a:pPr lvl="1"/>
             <a:r>
-              <a:rPr lang="de-DE" smtClean="0"/>
+              <a:rPr lang="de-DE"/>
               <a:t>Zweite Ebene</a:t>
             </a:r>
           </a:p>
           <a:p>
             <a:pPr lvl="2"/>
             <a:r>
-              <a:rPr lang="de-DE" smtClean="0"/>
+              <a:rPr lang="de-DE"/>
               <a:t>Dritte Ebene</a:t>
             </a:r>
           </a:p>
           <a:p>
             <a:pPr lvl="3"/>
             <a:r>
-              <a:rPr lang="de-DE" smtClean="0"/>
+              <a:rPr lang="de-DE"/>
               <a:t>Vierte Ebene</a:t>
             </a:r>
           </a:p>
           <a:p>
             <a:pPr lvl="4"/>
             <a:r>
-              <a:rPr lang="de-DE" smtClean="0"/>
+              <a:rPr lang="de-DE"/>
               <a:t>Fünfte Ebene</a:t>
             </a:r>
             <a:endParaRPr lang="en-US" dirty="0"/>
@@ -2084,7 +2088,7 @@
           <a:p>
             <a:pPr lvl="0"/>
             <a:r>
-              <a:rPr lang="de-DE" smtClean="0"/>
+              <a:rPr lang="de-DE"/>
               <a:t>Textmasterformat bearbeiten</a:t>
             </a:r>
           </a:p>
@@ -2107,7 +2111,7 @@
           <a:p>
             <a:fld id="{9E2A6698-0C91-4185-99A0-59A61138E5C6}" type="datetimeFigureOut">
               <a:rPr lang="de-DE" smtClean="0"/>
-              <a:t>04.10.2017</a:t>
+              <a:t>09.10.2017</a:t>
             </a:fld>
             <a:endParaRPr lang="de-DE"/>
           </a:p>
@@ -2210,7 +2214,7 @@
           </a:lstStyle>
           <a:p>
             <a:r>
-              <a:rPr lang="de-DE" smtClean="0"/>
+              <a:rPr lang="de-DE"/>
               <a:t>Titelmasterformat durch Klicken bearbeiten</a:t>
             </a:r>
             <a:endParaRPr lang="en-US" dirty="0"/>
@@ -2275,7 +2279,7 @@
           </a:lstStyle>
           <a:p>
             <a:r>
-              <a:rPr lang="de-DE" smtClean="0"/>
+              <a:rPr lang="de-DE"/>
               <a:t>Bild durch Klicken auf Symbol hinzufügen</a:t>
             </a:r>
             <a:endParaRPr lang="en-US" dirty="0"/>
@@ -2341,7 +2345,7 @@
           <a:p>
             <a:pPr lvl="0"/>
             <a:r>
-              <a:rPr lang="de-DE" smtClean="0"/>
+              <a:rPr lang="de-DE"/>
               <a:t>Textmasterformat bearbeiten</a:t>
             </a:r>
           </a:p>
@@ -2364,7 +2368,7 @@
           <a:p>
             <a:fld id="{9E2A6698-0C91-4185-99A0-59A61138E5C6}" type="datetimeFigureOut">
               <a:rPr lang="de-DE" smtClean="0"/>
-              <a:t>04.10.2017</a:t>
+              <a:t>09.10.2017</a:t>
             </a:fld>
             <a:endParaRPr lang="de-DE"/>
           </a:p>
@@ -2478,7 +2482,7 @@
           <a:lstStyle/>
           <a:p>
             <a:r>
-              <a:rPr lang="de-DE" smtClean="0"/>
+              <a:rPr lang="de-DE"/>
               <a:t>Titelmasterformat durch Klicken bearbeiten</a:t>
             </a:r>
             <a:endParaRPr lang="en-US" dirty="0"/>
@@ -2512,35 +2516,35 @@
           <a:p>
             <a:pPr lvl="0"/>
             <a:r>
-              <a:rPr lang="de-DE" smtClean="0"/>
+              <a:rPr lang="de-DE"/>
               <a:t>Textmasterformat bearbeiten</a:t>
             </a:r>
           </a:p>
           <a:p>
             <a:pPr lvl="1"/>
             <a:r>
-              <a:rPr lang="de-DE" smtClean="0"/>
+              <a:rPr lang="de-DE"/>
               <a:t>Zweite Ebene</a:t>
             </a:r>
           </a:p>
           <a:p>
             <a:pPr lvl="2"/>
             <a:r>
-              <a:rPr lang="de-DE" smtClean="0"/>
+              <a:rPr lang="de-DE"/>
               <a:t>Dritte Ebene</a:t>
             </a:r>
           </a:p>
           <a:p>
             <a:pPr lvl="3"/>
             <a:r>
-              <a:rPr lang="de-DE" smtClean="0"/>
+              <a:rPr lang="de-DE"/>
               <a:t>Vierte Ebene</a:t>
             </a:r>
           </a:p>
           <a:p>
             <a:pPr lvl="4"/>
             <a:r>
-              <a:rPr lang="de-DE" smtClean="0"/>
+              <a:rPr lang="de-DE"/>
               <a:t>Fünfte Ebene</a:t>
             </a:r>
             <a:endParaRPr lang="en-US" dirty="0"/>
@@ -2582,7 +2586,7 @@
           <a:p>
             <a:fld id="{9E2A6698-0C91-4185-99A0-59A61138E5C6}" type="datetimeFigureOut">
               <a:rPr lang="de-DE" smtClean="0"/>
-              <a:t>04.10.2017</a:t>
+              <a:t>09.10.2017</a:t>
             </a:fld>
             <a:endParaRPr lang="de-DE"/>
           </a:p>
@@ -3035,7 +3039,13 @@
       </p:sp>
       <p:grpSp>
         <p:nvGrpSpPr>
-          <p:cNvPr id="16" name="Gruppieren 15"/>
+          <p:cNvPr id="2" name="Gruppieren 1">
+            <a:extLst>
+              <a:ext uri="{FF2B5EF4-FFF2-40B4-BE49-F238E27FC236}">
+                <a16:creationId xmlns:a16="http://schemas.microsoft.com/office/drawing/2014/main" id="{03E5AB89-95AE-4589-9C5A-2F9E16C0B75F}"/>
+              </a:ext>
+            </a:extLst>
+          </p:cNvPr>
           <p:cNvGrpSpPr>
             <a:grpSpLocks noChangeAspect="1"/>
           </p:cNvGrpSpPr>
@@ -3043,26 +3053,281 @@
         </p:nvGrpSpPr>
         <p:grpSpPr>
           <a:xfrm>
-            <a:off x="132742" y="847117"/>
-            <a:ext cx="1296617" cy="1296617"/>
+            <a:off x="132404" y="846779"/>
+            <a:ext cx="1297292" cy="1297292"/>
             <a:chOff x="-106" y="-105"/>
-            <a:chExt cx="9525211" cy="9525210"/>
+            <a:chExt cx="9525212" cy="9525210"/>
           </a:xfrm>
         </p:grpSpPr>
         <p:sp>
           <p:nvSpPr>
-            <p:cNvPr id="12" name="Ellipse 11"/>
+            <p:cNvPr id="42" name="Freihandform: Form 41">
+              <a:extLst>
+                <a:ext uri="{FF2B5EF4-FFF2-40B4-BE49-F238E27FC236}">
+                  <a16:creationId xmlns:a16="http://schemas.microsoft.com/office/drawing/2014/main" id="{BC86A0F3-65A9-4B73-9AC6-AA79870A5BBF}"/>
+                </a:ext>
+              </a:extLst>
+            </p:cNvPr>
             <p:cNvSpPr/>
             <p:nvPr/>
           </p:nvSpPr>
           <p:spPr>
             <a:xfrm>
               <a:off x="-106" y="-105"/>
-              <a:ext cx="9525211" cy="9525210"/>
+              <a:ext cx="9525212" cy="9525210"/>
             </a:xfrm>
-            <a:prstGeom prst="ellipse">
+            <a:custGeom>
               <a:avLst/>
-            </a:prstGeom>
+              <a:gdLst>
+                <a:gd name="connsiteX0" fmla="*/ 4762606 w 9525212"/>
+                <a:gd name="connsiteY0" fmla="*/ 0 h 9525210"/>
+                <a:gd name="connsiteX1" fmla="*/ 9525212 w 9525212"/>
+                <a:gd name="connsiteY1" fmla="*/ 4762605 h 9525210"/>
+                <a:gd name="connsiteX2" fmla="*/ 4762606 w 9525212"/>
+                <a:gd name="connsiteY2" fmla="*/ 9525210 h 9525210"/>
+                <a:gd name="connsiteX3" fmla="*/ 2697819 w 9525212"/>
+                <a:gd name="connsiteY3" fmla="*/ 9055565 h 9525210"/>
+                <a:gd name="connsiteX4" fmla="*/ 2612519 w 9525212"/>
+                <a:gd name="connsiteY4" fmla="*/ 9011877 h 9525210"/>
+                <a:gd name="connsiteX5" fmla="*/ 2697732 w 9525212"/>
+                <a:gd name="connsiteY5" fmla="*/ 8917353 h 9525210"/>
+                <a:gd name="connsiteX6" fmla="*/ 4784052 w 9525212"/>
+                <a:gd name="connsiteY6" fmla="*/ 6602371 h 9525210"/>
+                <a:gd name="connsiteX7" fmla="*/ 4837859 w 9525212"/>
+                <a:gd name="connsiteY7" fmla="*/ 6650513 h 9525210"/>
+                <a:gd name="connsiteX8" fmla="*/ 5334104 w 9525212"/>
+                <a:gd name="connsiteY8" fmla="*/ 6622939 h 9525210"/>
+                <a:gd name="connsiteX9" fmla="*/ 5390061 w 9525212"/>
+                <a:gd name="connsiteY9" fmla="*/ 6238491 h 9525210"/>
+                <a:gd name="connsiteX10" fmla="*/ 5380826 w 9525212"/>
+                <a:gd name="connsiteY10" fmla="*/ 6223081 h 9525210"/>
+                <a:gd name="connsiteX11" fmla="*/ 5385495 w 9525212"/>
+                <a:gd name="connsiteY11" fmla="*/ 6222821 h 9525210"/>
+                <a:gd name="connsiteX12" fmla="*/ 6884064 w 9525212"/>
+                <a:gd name="connsiteY12" fmla="*/ 4547919 h 9525210"/>
+                <a:gd name="connsiteX13" fmla="*/ 6356975 w 9525212"/>
+                <a:gd name="connsiteY13" fmla="*/ 3451749 h 9525210"/>
+                <a:gd name="connsiteX14" fmla="*/ 5371849 w 9525212"/>
+                <a:gd name="connsiteY14" fmla="*/ 3048528 h 9525210"/>
+                <a:gd name="connsiteX15" fmla="*/ 5209159 w 9525212"/>
+                <a:gd name="connsiteY15" fmla="*/ 3049349 h 9525210"/>
+                <a:gd name="connsiteX16" fmla="*/ 3710591 w 9525212"/>
+                <a:gd name="connsiteY16" fmla="*/ 4724253 h 9525210"/>
+                <a:gd name="connsiteX17" fmla="*/ 3710850 w 9525212"/>
+                <a:gd name="connsiteY17" fmla="*/ 4728923 h 9525210"/>
+                <a:gd name="connsiteX18" fmla="*/ 3694515 w 9525212"/>
+                <a:gd name="connsiteY18" fmla="*/ 4721454 h 9525210"/>
+                <a:gd name="connsiteX19" fmla="*/ 3318630 w 9525212"/>
+                <a:gd name="connsiteY19" fmla="*/ 4819659 h 9525210"/>
+                <a:gd name="connsiteX20" fmla="*/ 3346206 w 9525212"/>
+                <a:gd name="connsiteY20" fmla="*/ 5315903 h 9525210"/>
+                <a:gd name="connsiteX21" fmla="*/ 3400013 w 9525212"/>
+                <a:gd name="connsiteY21" fmla="*/ 5364047 h 9525210"/>
+                <a:gd name="connsiteX22" fmla="*/ 1156451 w 9525212"/>
+                <a:gd name="connsiteY22" fmla="*/ 7871609 h 9525210"/>
+                <a:gd name="connsiteX23" fmla="*/ 1087548 w 9525212"/>
+                <a:gd name="connsiteY23" fmla="*/ 7792064 h 9525210"/>
+                <a:gd name="connsiteX24" fmla="*/ 0 w 9525212"/>
+                <a:gd name="connsiteY24" fmla="*/ 4762605 h 9525210"/>
+                <a:gd name="connsiteX25" fmla="*/ 4762606 w 9525212"/>
+                <a:gd name="connsiteY25" fmla="*/ 0 h 9525210"/>
+              </a:gdLst>
+              <a:ahLst/>
+              <a:cxnLst>
+                <a:cxn ang="0">
+                  <a:pos x="connsiteX0" y="connsiteY0"/>
+                </a:cxn>
+                <a:cxn ang="0">
+                  <a:pos x="connsiteX1" y="connsiteY1"/>
+                </a:cxn>
+                <a:cxn ang="0">
+                  <a:pos x="connsiteX2" y="connsiteY2"/>
+                </a:cxn>
+                <a:cxn ang="0">
+                  <a:pos x="connsiteX3" y="connsiteY3"/>
+                </a:cxn>
+                <a:cxn ang="0">
+                  <a:pos x="connsiteX4" y="connsiteY4"/>
+                </a:cxn>
+                <a:cxn ang="0">
+                  <a:pos x="connsiteX5" y="connsiteY5"/>
+                </a:cxn>
+                <a:cxn ang="0">
+                  <a:pos x="connsiteX6" y="connsiteY6"/>
+                </a:cxn>
+                <a:cxn ang="0">
+                  <a:pos x="connsiteX7" y="connsiteY7"/>
+                </a:cxn>
+                <a:cxn ang="0">
+                  <a:pos x="connsiteX8" y="connsiteY8"/>
+                </a:cxn>
+                <a:cxn ang="0">
+                  <a:pos x="connsiteX9" y="connsiteY9"/>
+                </a:cxn>
+                <a:cxn ang="0">
+                  <a:pos x="connsiteX10" y="connsiteY10"/>
+                </a:cxn>
+                <a:cxn ang="0">
+                  <a:pos x="connsiteX11" y="connsiteY11"/>
+                </a:cxn>
+                <a:cxn ang="0">
+                  <a:pos x="connsiteX12" y="connsiteY12"/>
+                </a:cxn>
+                <a:cxn ang="0">
+                  <a:pos x="connsiteX13" y="connsiteY13"/>
+                </a:cxn>
+                <a:cxn ang="0">
+                  <a:pos x="connsiteX14" y="connsiteY14"/>
+                </a:cxn>
+                <a:cxn ang="0">
+                  <a:pos x="connsiteX15" y="connsiteY15"/>
+                </a:cxn>
+                <a:cxn ang="0">
+                  <a:pos x="connsiteX16" y="connsiteY16"/>
+                </a:cxn>
+                <a:cxn ang="0">
+                  <a:pos x="connsiteX17" y="connsiteY17"/>
+                </a:cxn>
+                <a:cxn ang="0">
+                  <a:pos x="connsiteX18" y="connsiteY18"/>
+                </a:cxn>
+                <a:cxn ang="0">
+                  <a:pos x="connsiteX19" y="connsiteY19"/>
+                </a:cxn>
+                <a:cxn ang="0">
+                  <a:pos x="connsiteX20" y="connsiteY20"/>
+                </a:cxn>
+                <a:cxn ang="0">
+                  <a:pos x="connsiteX21" y="connsiteY21"/>
+                </a:cxn>
+                <a:cxn ang="0">
+                  <a:pos x="connsiteX22" y="connsiteY22"/>
+                </a:cxn>
+                <a:cxn ang="0">
+                  <a:pos x="connsiteX23" y="connsiteY23"/>
+                </a:cxn>
+                <a:cxn ang="0">
+                  <a:pos x="connsiteX24" y="connsiteY24"/>
+                </a:cxn>
+                <a:cxn ang="0">
+                  <a:pos x="connsiteX25" y="connsiteY25"/>
+                </a:cxn>
+              </a:cxnLst>
+              <a:rect l="l" t="t" r="r" b="b"/>
+              <a:pathLst>
+                <a:path w="9525212" h="9525210">
+                  <a:moveTo>
+                    <a:pt x="4762606" y="0"/>
+                  </a:moveTo>
+                  <a:cubicBezTo>
+                    <a:pt x="7392921" y="0"/>
+                    <a:pt x="9525212" y="2132291"/>
+                    <a:pt x="9525212" y="4762605"/>
+                  </a:cubicBezTo>
+                  <a:cubicBezTo>
+                    <a:pt x="9525212" y="7392919"/>
+                    <a:pt x="7392921" y="9525210"/>
+                    <a:pt x="4762606" y="9525210"/>
+                  </a:cubicBezTo>
+                  <a:cubicBezTo>
+                    <a:pt x="4022830" y="9525210"/>
+                    <a:pt x="3322448" y="9356542"/>
+                    <a:pt x="2697819" y="9055565"/>
+                  </a:cubicBezTo>
+                  <a:lnTo>
+                    <a:pt x="2612519" y="9011877"/>
+                  </a:lnTo>
+                  <a:lnTo>
+                    <a:pt x="2697732" y="8917353"/>
+                  </a:lnTo>
+                  <a:cubicBezTo>
+                    <a:pt x="3422604" y="8113458"/>
+                    <a:pt x="4338784" y="7100034"/>
+                    <a:pt x="4784052" y="6602371"/>
+                  </a:cubicBezTo>
+                  <a:lnTo>
+                    <a:pt x="4837859" y="6650513"/>
+                  </a:lnTo>
+                  <a:cubicBezTo>
+                    <a:pt x="4982507" y="6779932"/>
+                    <a:pt x="5204685" y="6767587"/>
+                    <a:pt x="5334104" y="6622939"/>
+                  </a:cubicBezTo>
+                  <a:cubicBezTo>
+                    <a:pt x="5431168" y="6514452"/>
+                    <a:pt x="5448491" y="6362357"/>
+                    <a:pt x="5390061" y="6238491"/>
+                  </a:cubicBezTo>
+                  <a:lnTo>
+                    <a:pt x="5380826" y="6223081"/>
+                  </a:lnTo>
+                  <a:lnTo>
+                    <a:pt x="5385495" y="6222821"/>
+                  </a:lnTo>
+                  <a:cubicBezTo>
+                    <a:pt x="6261827" y="6174128"/>
+                    <a:pt x="6932759" y="5424249"/>
+                    <a:pt x="6884064" y="4547919"/>
+                  </a:cubicBezTo>
+                  <a:cubicBezTo>
+                    <a:pt x="6859717" y="4109751"/>
+                    <a:pt x="6660073" y="3722938"/>
+                    <a:pt x="6356975" y="3451749"/>
+                  </a:cubicBezTo>
+                  <a:cubicBezTo>
+                    <a:pt x="6091764" y="3214460"/>
+                    <a:pt x="5747346" y="3065699"/>
+                    <a:pt x="5371849" y="3048528"/>
+                  </a:cubicBezTo>
+                  <a:cubicBezTo>
+                    <a:pt x="5318207" y="3046074"/>
+                    <a:pt x="5263929" y="3046306"/>
+                    <a:pt x="5209159" y="3049349"/>
+                  </a:cubicBezTo>
+                  <a:cubicBezTo>
+                    <a:pt x="4332829" y="3098043"/>
+                    <a:pt x="3661895" y="3847922"/>
+                    <a:pt x="3710591" y="4724253"/>
+                  </a:cubicBezTo>
+                  <a:lnTo>
+                    <a:pt x="3710850" y="4728923"/>
+                  </a:lnTo>
+                  <a:lnTo>
+                    <a:pt x="3694515" y="4721454"/>
+                  </a:lnTo>
+                  <a:cubicBezTo>
+                    <a:pt x="3564937" y="4677106"/>
+                    <a:pt x="3415696" y="4711173"/>
+                    <a:pt x="3318630" y="4819659"/>
+                  </a:cubicBezTo>
+                  <a:cubicBezTo>
+                    <a:pt x="3189212" y="4964307"/>
+                    <a:pt x="3201558" y="5186484"/>
+                    <a:pt x="3346206" y="5315903"/>
+                  </a:cubicBezTo>
+                  <a:lnTo>
+                    <a:pt x="3400013" y="5364047"/>
+                  </a:lnTo>
+                  <a:lnTo>
+                    <a:pt x="1156451" y="7871609"/>
+                  </a:lnTo>
+                  <a:lnTo>
+                    <a:pt x="1087548" y="7792064"/>
+                  </a:lnTo>
+                  <a:cubicBezTo>
+                    <a:pt x="408134" y="6968805"/>
+                    <a:pt x="0" y="5913368"/>
+                    <a:pt x="0" y="4762605"/>
+                  </a:cubicBezTo>
+                  <a:cubicBezTo>
+                    <a:pt x="0" y="2132291"/>
+                    <a:pt x="2132291" y="0"/>
+                    <a:pt x="4762606" y="0"/>
+                  </a:cubicBezTo>
+                  <a:close/>
+                </a:path>
+              </a:pathLst>
+            </a:custGeom>
             <a:solidFill>
               <a:schemeClr val="tx1"/>
             </a:solidFill>
@@ -3103,7 +3368,13 @@
         </p:sp>
         <p:sp>
           <p:nvSpPr>
-            <p:cNvPr id="13" name="Rechteck 12"/>
+            <p:cNvPr id="43" name="Rechteck 42">
+              <a:extLst>
+                <a:ext uri="{FF2B5EF4-FFF2-40B4-BE49-F238E27FC236}">
+                  <a16:creationId xmlns:a16="http://schemas.microsoft.com/office/drawing/2014/main" id="{FD8B3276-CF6F-4F22-BB6E-99E7213F06D1}"/>
+                </a:ext>
+              </a:extLst>
+            </p:cNvPr>
             <p:cNvSpPr/>
             <p:nvPr/>
           </p:nvSpPr>
@@ -3151,7 +3422,13 @@
         </p:sp>
         <p:sp>
           <p:nvSpPr>
-            <p:cNvPr id="14" name="Rechteck: abgerundete Ecken 32"/>
+            <p:cNvPr id="44" name="Rechteck: abgerundete Ecken 32">
+              <a:extLst>
+                <a:ext uri="{FF2B5EF4-FFF2-40B4-BE49-F238E27FC236}">
+                  <a16:creationId xmlns:a16="http://schemas.microsoft.com/office/drawing/2014/main" id="{2BD6C9C3-717C-440D-A09E-FAE406EA3DA0}"/>
+                </a:ext>
+              </a:extLst>
+            </p:cNvPr>
             <p:cNvSpPr>
               <a:spLocks noChangeAspect="1"/>
             </p:cNvSpPr>
@@ -3227,62 +3504,68 @@
         </p:sp>
         <p:sp>
           <p:nvSpPr>
-            <p:cNvPr id="15" name="Freihandform 14"/>
+            <p:cNvPr id="45" name="Freihandform: Form 44">
+              <a:extLst>
+                <a:ext uri="{FF2B5EF4-FFF2-40B4-BE49-F238E27FC236}">
+                  <a16:creationId xmlns:a16="http://schemas.microsoft.com/office/drawing/2014/main" id="{A7DC763D-AC41-46F3-ACB5-674A0D023643}"/>
+                </a:ext>
+              </a:extLst>
+            </p:cNvPr>
             <p:cNvSpPr/>
             <p:nvPr/>
           </p:nvSpPr>
           <p:spPr>
             <a:xfrm>
-              <a:off x="1206224" y="3025104"/>
-              <a:ext cx="5800990" cy="6022144"/>
+              <a:off x="1156299" y="3046648"/>
+              <a:ext cx="5730150" cy="5965092"/>
             </a:xfrm>
             <a:custGeom>
               <a:avLst/>
               <a:gdLst>
-                <a:gd name="connsiteX0" fmla="*/ 4845092 w 6557273"/>
-                <a:gd name="connsiteY0" fmla="*/ 1888 h 6807260"/>
-                <a:gd name="connsiteX1" fmla="*/ 5958651 w 6557273"/>
-                <a:gd name="connsiteY1" fmla="*/ 457678 h 6807260"/>
-                <a:gd name="connsiteX2" fmla="*/ 6554457 w 6557273"/>
-                <a:gd name="connsiteY2" fmla="*/ 1696757 h 6807260"/>
-                <a:gd name="connsiteX3" fmla="*/ 4860518 w 6557273"/>
-                <a:gd name="connsiteY3" fmla="*/ 3590019 h 6807260"/>
-                <a:gd name="connsiteX4" fmla="*/ 4855240 w 6557273"/>
-                <a:gd name="connsiteY4" fmla="*/ 3590313 h 6807260"/>
-                <a:gd name="connsiteX5" fmla="*/ 4865679 w 6557273"/>
-                <a:gd name="connsiteY5" fmla="*/ 3607732 h 6807260"/>
-                <a:gd name="connsiteX6" fmla="*/ 4802426 w 6557273"/>
-                <a:gd name="connsiteY6" fmla="*/ 4042301 h 6807260"/>
-                <a:gd name="connsiteX7" fmla="*/ 4241485 w 6557273"/>
-                <a:gd name="connsiteY7" fmla="*/ 4073470 h 6807260"/>
-                <a:gd name="connsiteX8" fmla="*/ 4180664 w 6557273"/>
-                <a:gd name="connsiteY8" fmla="*/ 4019052 h 6807260"/>
-                <a:gd name="connsiteX9" fmla="*/ 1822347 w 6557273"/>
-                <a:gd name="connsiteY9" fmla="*/ 6635841 h 6807260"/>
-                <a:gd name="connsiteX10" fmla="*/ 1667815 w 6557273"/>
-                <a:gd name="connsiteY10" fmla="*/ 6807260 h 6807260"/>
-                <a:gd name="connsiteX11" fmla="*/ 1453812 w 6557273"/>
-                <a:gd name="connsiteY11" fmla="*/ 6697654 h 6807260"/>
-                <a:gd name="connsiteX12" fmla="*/ 34941 w 6557273"/>
-                <a:gd name="connsiteY12" fmla="*/ 5583655 h 6807260"/>
-                <a:gd name="connsiteX13" fmla="*/ 0 w 6557273"/>
-                <a:gd name="connsiteY13" fmla="*/ 5543318 h 6807260"/>
-                <a:gd name="connsiteX14" fmla="*/ 2616186 w 6557273"/>
-                <a:gd name="connsiteY14" fmla="*/ 2619285 h 6807260"/>
-                <a:gd name="connsiteX15" fmla="*/ 2555363 w 6557273"/>
-                <a:gd name="connsiteY15" fmla="*/ 2564865 h 6807260"/>
-                <a:gd name="connsiteX16" fmla="*/ 2524193 w 6557273"/>
-                <a:gd name="connsiteY16" fmla="*/ 2003925 h 6807260"/>
-                <a:gd name="connsiteX17" fmla="*/ 2949082 w 6557273"/>
-                <a:gd name="connsiteY17" fmla="*/ 1892917 h 6807260"/>
-                <a:gd name="connsiteX18" fmla="*/ 2967547 w 6557273"/>
-                <a:gd name="connsiteY18" fmla="*/ 1901359 h 6807260"/>
-                <a:gd name="connsiteX19" fmla="*/ 2967254 w 6557273"/>
-                <a:gd name="connsiteY19" fmla="*/ 1896081 h 6807260"/>
-                <a:gd name="connsiteX20" fmla="*/ 4661193 w 6557273"/>
-                <a:gd name="connsiteY20" fmla="*/ 2817 h 6807260"/>
-                <a:gd name="connsiteX21" fmla="*/ 4845092 w 6557273"/>
-                <a:gd name="connsiteY21" fmla="*/ 1888 h 6807260"/>
+                <a:gd name="connsiteX0" fmla="*/ 4215444 w 5730150"/>
+                <a:gd name="connsiteY0" fmla="*/ 1670 h 5965092"/>
+                <a:gd name="connsiteX1" fmla="*/ 5200570 w 5730150"/>
+                <a:gd name="connsiteY1" fmla="*/ 404892 h 5965092"/>
+                <a:gd name="connsiteX2" fmla="*/ 5727659 w 5730150"/>
+                <a:gd name="connsiteY2" fmla="*/ 1501062 h 5965092"/>
+                <a:gd name="connsiteX3" fmla="*/ 4229090 w 5730150"/>
+                <a:gd name="connsiteY3" fmla="*/ 3175964 h 5965092"/>
+                <a:gd name="connsiteX4" fmla="*/ 4224421 w 5730150"/>
+                <a:gd name="connsiteY4" fmla="*/ 3176224 h 5965092"/>
+                <a:gd name="connsiteX5" fmla="*/ 4233656 w 5730150"/>
+                <a:gd name="connsiteY5" fmla="*/ 3191634 h 5965092"/>
+                <a:gd name="connsiteX6" fmla="*/ 4177699 w 5730150"/>
+                <a:gd name="connsiteY6" fmla="*/ 3576082 h 5965092"/>
+                <a:gd name="connsiteX7" fmla="*/ 3681454 w 5730150"/>
+                <a:gd name="connsiteY7" fmla="*/ 3603656 h 5965092"/>
+                <a:gd name="connsiteX8" fmla="*/ 3627647 w 5730150"/>
+                <a:gd name="connsiteY8" fmla="*/ 3555514 h 5965092"/>
+                <a:gd name="connsiteX9" fmla="*/ 1541327 w 5730150"/>
+                <a:gd name="connsiteY9" fmla="*/ 5870496 h 5965092"/>
+                <a:gd name="connsiteX10" fmla="*/ 1456050 w 5730150"/>
+                <a:gd name="connsiteY10" fmla="*/ 5965092 h 5965092"/>
+                <a:gd name="connsiteX11" fmla="*/ 1336059 w 5730150"/>
+                <a:gd name="connsiteY11" fmla="*/ 5903636 h 5965092"/>
+                <a:gd name="connsiteX12" fmla="*/ 80833 w 5730150"/>
+                <a:gd name="connsiteY12" fmla="*/ 4918120 h 5965092"/>
+                <a:gd name="connsiteX13" fmla="*/ 0 w 5730150"/>
+                <a:gd name="connsiteY13" fmla="*/ 4824804 h 5965092"/>
+                <a:gd name="connsiteX14" fmla="*/ 2243608 w 5730150"/>
+                <a:gd name="connsiteY14" fmla="*/ 2317190 h 5965092"/>
+                <a:gd name="connsiteX15" fmla="*/ 2189800 w 5730150"/>
+                <a:gd name="connsiteY15" fmla="*/ 2269046 h 5965092"/>
+                <a:gd name="connsiteX16" fmla="*/ 2162225 w 5730150"/>
+                <a:gd name="connsiteY16" fmla="*/ 1772802 h 5965092"/>
+                <a:gd name="connsiteX17" fmla="*/ 2538110 w 5730150"/>
+                <a:gd name="connsiteY17" fmla="*/ 1674597 h 5965092"/>
+                <a:gd name="connsiteX18" fmla="*/ 2554445 w 5730150"/>
+                <a:gd name="connsiteY18" fmla="*/ 1682066 h 5965092"/>
+                <a:gd name="connsiteX19" fmla="*/ 2554186 w 5730150"/>
+                <a:gd name="connsiteY19" fmla="*/ 1677396 h 5965092"/>
+                <a:gd name="connsiteX20" fmla="*/ 4052754 w 5730150"/>
+                <a:gd name="connsiteY20" fmla="*/ 2492 h 5965092"/>
+                <a:gd name="connsiteX21" fmla="*/ 4215444 w 5730150"/>
+                <a:gd name="connsiteY21" fmla="*/ 1670 h 5965092"/>
               </a:gdLst>
               <a:ahLst/>
               <a:cxnLst>
@@ -3355,94 +3638,94 @@
               </a:cxnLst>
               <a:rect l="l" t="t" r="r" b="b"/>
               <a:pathLst>
-                <a:path w="6557273" h="6807260">
+                <a:path w="5730150" h="5965092">
                   <a:moveTo>
-                    <a:pt x="4845092" y="1888"/>
+                    <a:pt x="4215444" y="1670"/>
                   </a:moveTo>
                   <a:cubicBezTo>
-                    <a:pt x="5269544" y="21298"/>
-                    <a:pt x="5658864" y="189453"/>
-                    <a:pt x="5958651" y="457678"/>
+                    <a:pt x="4590941" y="18842"/>
+                    <a:pt x="4935359" y="167603"/>
+                    <a:pt x="5200570" y="404892"/>
                   </a:cubicBezTo>
                   <a:cubicBezTo>
-                    <a:pt x="6301264" y="764222"/>
-                    <a:pt x="6526936" y="1201465"/>
-                    <a:pt x="6554457" y="1696757"/>
+                    <a:pt x="5503668" y="676081"/>
+                    <a:pt x="5703312" y="1062894"/>
+                    <a:pt x="5727659" y="1501062"/>
                   </a:cubicBezTo>
                   <a:cubicBezTo>
-                    <a:pt x="6609500" y="2687336"/>
-                    <a:pt x="5851098" y="3534978"/>
-                    <a:pt x="4860518" y="3590019"/>
+                    <a:pt x="5776354" y="2377392"/>
+                    <a:pt x="5105422" y="3127271"/>
+                    <a:pt x="4229090" y="3175964"/>
                   </a:cubicBezTo>
                   <a:lnTo>
-                    <a:pt x="4855240" y="3590313"/>
+                    <a:pt x="4224421" y="3176224"/>
                   </a:lnTo>
                   <a:lnTo>
-                    <a:pt x="4865679" y="3607732"/>
+                    <a:pt x="4233656" y="3191634"/>
                   </a:lnTo>
                   <a:cubicBezTo>
-                    <a:pt x="4931726" y="3747747"/>
-                    <a:pt x="4912145" y="3919671"/>
-                    <a:pt x="4802426" y="4042301"/>
+                    <a:pt x="4292086" y="3315500"/>
+                    <a:pt x="4274763" y="3467595"/>
+                    <a:pt x="4177699" y="3576082"/>
                   </a:cubicBezTo>
                   <a:cubicBezTo>
-                    <a:pt x="4656135" y="4205807"/>
-                    <a:pt x="4404992" y="4219762"/>
-                    <a:pt x="4241485" y="4073470"/>
+                    <a:pt x="4048280" y="3720730"/>
+                    <a:pt x="3826102" y="3733075"/>
+                    <a:pt x="3681454" y="3603656"/>
                   </a:cubicBezTo>
                   <a:lnTo>
-                    <a:pt x="4180664" y="4019052"/>
+                    <a:pt x="3627647" y="3555514"/>
                   </a:lnTo>
                   <a:cubicBezTo>
-                    <a:pt x="3677346" y="4581596"/>
-                    <a:pt x="2641722" y="5727141"/>
-                    <a:pt x="1822347" y="6635841"/>
+                    <a:pt x="3182379" y="4053177"/>
+                    <a:pt x="2266199" y="5066601"/>
+                    <a:pt x="1541327" y="5870496"/>
                   </a:cubicBezTo>
                   <a:lnTo>
-                    <a:pt x="1667815" y="6807260"/>
+                    <a:pt x="1456050" y="5965092"/>
                   </a:lnTo>
                   <a:lnTo>
-                    <a:pt x="1453812" y="6697654"/>
+                    <a:pt x="1336059" y="5903636"/>
                   </a:lnTo>
                   <a:cubicBezTo>
-                    <a:pt x="919847" y="6407587"/>
-                    <a:pt x="440444" y="6029808"/>
-                    <a:pt x="34941" y="5583655"/>
+                    <a:pt x="863679" y="5647024"/>
+                    <a:pt x="439568" y="5312816"/>
+                    <a:pt x="80833" y="4918120"/>
                   </a:cubicBezTo>
                   <a:lnTo>
-                    <a:pt x="0" y="5543318"/>
+                    <a:pt x="0" y="4824804"/>
                   </a:lnTo>
                   <a:lnTo>
-                    <a:pt x="2616186" y="2619285"/>
+                    <a:pt x="2243608" y="2317190"/>
                   </a:lnTo>
                   <a:lnTo>
-                    <a:pt x="2555363" y="2564865"/>
+                    <a:pt x="2189800" y="2269046"/>
                   </a:lnTo>
                   <a:cubicBezTo>
-                    <a:pt x="2391857" y="2418573"/>
-                    <a:pt x="2377902" y="2167431"/>
-                    <a:pt x="2524193" y="2003925"/>
+                    <a:pt x="2045152" y="2139627"/>
+                    <a:pt x="2032807" y="1917450"/>
+                    <a:pt x="2162225" y="1772802"/>
                   </a:cubicBezTo>
                   <a:cubicBezTo>
-                    <a:pt x="2633913" y="1881295"/>
-                    <a:pt x="2802611" y="1842787"/>
-                    <a:pt x="2949082" y="1892917"/>
+                    <a:pt x="2259291" y="1664316"/>
+                    <a:pt x="2408532" y="1630249"/>
+                    <a:pt x="2538110" y="1674597"/>
                   </a:cubicBezTo>
                   <a:lnTo>
-                    <a:pt x="2967547" y="1901359"/>
+                    <a:pt x="2554445" y="1682066"/>
                   </a:lnTo>
                   <a:lnTo>
-                    <a:pt x="2967254" y="1896081"/>
+                    <a:pt x="2554186" y="1677396"/>
                   </a:lnTo>
                   <a:cubicBezTo>
-                    <a:pt x="2912210" y="905501"/>
-                    <a:pt x="3670614" y="57859"/>
-                    <a:pt x="4661193" y="2817"/>
+                    <a:pt x="2505490" y="801065"/>
+                    <a:pt x="3176424" y="51186"/>
+                    <a:pt x="4052754" y="2492"/>
                   </a:cubicBezTo>
                   <a:cubicBezTo>
-                    <a:pt x="4723103" y="-623"/>
-                    <a:pt x="4784457" y="-886"/>
-                    <a:pt x="4845092" y="1888"/>
+                    <a:pt x="4107524" y="-551"/>
+                    <a:pt x="4161802" y="-784"/>
+                    <a:pt x="4215444" y="1670"/>
                   </a:cubicBezTo>
                   <a:close/>
                 </a:path>
@@ -6919,137 +7202,6 @@
           </p:style>
         </p:cxnSp>
       </p:grpSp>
-      <p:sp>
-        <p:nvSpPr>
-          <p:cNvPr id="41" name="Freihandform 40"/>
-          <p:cNvSpPr/>
-          <p:nvPr/>
-        </p:nvSpPr>
-        <p:spPr>
-          <a:xfrm>
-            <a:off x="155822" y="1774628"/>
-            <a:ext cx="475567" cy="464223"/>
-          </a:xfrm>
-          <a:custGeom>
-            <a:avLst/>
-            <a:gdLst>
-              <a:gd name="connsiteX0" fmla="*/ 279163 w 475567"/>
-              <a:gd name="connsiteY0" fmla="*/ 0 h 464223"/>
-              <a:gd name="connsiteX1" fmla="*/ 475567 w 475567"/>
-              <a:gd name="connsiteY1" fmla="*/ 159506 h 464223"/>
-              <a:gd name="connsiteX2" fmla="*/ 447386 w 475567"/>
-              <a:gd name="connsiteY2" fmla="*/ 190883 h 464223"/>
-              <a:gd name="connsiteX3" fmla="*/ 219456 w 475567"/>
-              <a:gd name="connsiteY3" fmla="*/ 443580 h 464223"/>
-              <a:gd name="connsiteX4" fmla="*/ 200846 w 475567"/>
-              <a:gd name="connsiteY4" fmla="*/ 464223 h 464223"/>
-              <a:gd name="connsiteX5" fmla="*/ 175075 w 475567"/>
-              <a:gd name="connsiteY5" fmla="*/ 451024 h 464223"/>
-              <a:gd name="connsiteX6" fmla="*/ 4208 w 475567"/>
-              <a:gd name="connsiteY6" fmla="*/ 316871 h 464223"/>
-              <a:gd name="connsiteX7" fmla="*/ 0 w 475567"/>
-              <a:gd name="connsiteY7" fmla="*/ 312013 h 464223"/>
-            </a:gdLst>
-            <a:ahLst/>
-            <a:cxnLst>
-              <a:cxn ang="0">
-                <a:pos x="connsiteX0" y="connsiteY0"/>
-              </a:cxn>
-              <a:cxn ang="0">
-                <a:pos x="connsiteX1" y="connsiteY1"/>
-              </a:cxn>
-              <a:cxn ang="0">
-                <a:pos x="connsiteX2" y="connsiteY2"/>
-              </a:cxn>
-              <a:cxn ang="0">
-                <a:pos x="connsiteX3" y="connsiteY3"/>
-              </a:cxn>
-              <a:cxn ang="0">
-                <a:pos x="connsiteX4" y="connsiteY4"/>
-              </a:cxn>
-              <a:cxn ang="0">
-                <a:pos x="connsiteX5" y="connsiteY5"/>
-              </a:cxn>
-              <a:cxn ang="0">
-                <a:pos x="connsiteX6" y="connsiteY6"/>
-              </a:cxn>
-              <a:cxn ang="0">
-                <a:pos x="connsiteX7" y="connsiteY7"/>
-              </a:cxn>
-            </a:cxnLst>
-            <a:rect l="l" t="t" r="r" b="b"/>
-            <a:pathLst>
-              <a:path w="475567" h="464223">
-                <a:moveTo>
-                  <a:pt x="279163" y="0"/>
-                </a:moveTo>
-                <a:lnTo>
-                  <a:pt x="475567" y="159506"/>
-                </a:lnTo>
-                <a:lnTo>
-                  <a:pt x="447386" y="190883"/>
-                </a:lnTo>
-                <a:cubicBezTo>
-                  <a:pt x="382114" y="263391"/>
-                  <a:pt x="293460" y="361508"/>
-                  <a:pt x="219456" y="443580"/>
-                </a:cubicBezTo>
-                <a:lnTo>
-                  <a:pt x="200846" y="464223"/>
-                </a:lnTo>
-                <a:lnTo>
-                  <a:pt x="175075" y="451024"/>
-                </a:lnTo>
-                <a:cubicBezTo>
-                  <a:pt x="110772" y="416093"/>
-                  <a:pt x="53040" y="370599"/>
-                  <a:pt x="4208" y="316871"/>
-                </a:cubicBezTo>
-                <a:lnTo>
-                  <a:pt x="0" y="312013"/>
-                </a:lnTo>
-                <a:close/>
-              </a:path>
-            </a:pathLst>
-          </a:custGeom>
-          <a:solidFill>
-            <a:schemeClr val="bg1"/>
-          </a:solidFill>
-          <a:ln>
-            <a:noFill/>
-          </a:ln>
-        </p:spPr>
-        <p:style>
-          <a:lnRef idx="2">
-            <a:schemeClr val="accent1">
-              <a:shade val="50000"/>
-            </a:schemeClr>
-          </a:lnRef>
-          <a:fillRef idx="1">
-            <a:schemeClr val="accent1"/>
-          </a:fillRef>
-          <a:effectRef idx="0">
-            <a:schemeClr val="accent1"/>
-          </a:effectRef>
-          <a:fontRef idx="minor">
-            <a:schemeClr val="lt1"/>
-          </a:fontRef>
-        </p:style>
-        <p:txBody>
-          <a:bodyPr wrap="square" rtlCol="0" anchor="ctr">
-            <a:noAutofit/>
-          </a:bodyPr>
-          <a:lstStyle/>
-          <a:p>
-            <a:pPr algn="ctr" defTabSz="403228"/>
-            <a:endParaRPr lang="de-DE" sz="1588">
-              <a:solidFill>
-                <a:prstClr val="white"/>
-              </a:solidFill>
-            </a:endParaRPr>
-          </a:p>
-        </p:txBody>
-      </p:sp>
     </p:spTree>
     <p:extLst>
       <p:ext uri="{BB962C8B-B14F-4D97-AF65-F5344CB8AC3E}">
@@ -7060,13 +7212,6 @@
   <p:clrMapOvr>
     <a:masterClrMapping/>
   </p:clrMapOvr>
-  <p:timing>
-    <p:tnLst>
-      <p:par>
-        <p:cTn id="1" dur="indefinite" restart="never" nodeType="tmRoot"/>
-      </p:par>
-    </p:tnLst>
-  </p:timing>
 </p:sld>
 </file>
 

</xml_diff>